<commit_message>
Added FY20 budget and clearance number on Alecs presentation
</commit_message>
<xml_diff>
--- a/docs/Presentations/intern_presentations/alec_fy19.pptx
+++ b/docs/Presentations/intern_presentations/alec_fy19.pptx
@@ -8863,6 +8863,45 @@
           </a:prstGeom>
         </p:spPr>
       </p:pic>
+      <p:sp>
+        <p:nvSpPr>
+          <p:cNvPr id="2" name="TextBox 1">
+            <a:extLst>
+              <a:ext uri="{FF2B5EF4-FFF2-40B4-BE49-F238E27FC236}">
+                <a16:creationId xmlns:a16="http://schemas.microsoft.com/office/drawing/2014/main" id="{E185E3BC-1561-C44C-9989-BA3763662AD5}"/>
+              </a:ext>
+            </a:extLst>
+          </p:cNvPr>
+          <p:cNvSpPr txBox="1"/>
+          <p:nvPr/>
+        </p:nvSpPr>
+        <p:spPr>
+          <a:xfrm>
+            <a:off x="8268288" y="4897279"/>
+            <a:ext cx="885179" cy="246221"/>
+          </a:xfrm>
+          <a:prstGeom prst="rect">
+            <a:avLst/>
+          </a:prstGeom>
+          <a:noFill/>
+        </p:spPr>
+        <p:txBody>
+          <a:bodyPr wrap="none" rtlCol="0">
+            <a:spAutoFit/>
+          </a:bodyPr>
+          <a:lstStyle/>
+          <a:p>
+            <a:r>
+              <a:rPr lang="en-US" sz="1000" dirty="0">
+                <a:solidFill>
+                  <a:schemeClr val="tx1"/>
+                </a:solidFill>
+              </a:rPr>
+              <a:t>CL#19-4964</a:t>
+            </a:r>
+          </a:p>
+        </p:txBody>
+      </p:sp>
     </p:spTree>
   </p:cSld>
   <p:clrMapOvr>

</xml_diff>